<commit_message>
Added muscle data to DESeq2
</commit_message>
<xml_diff>
--- a/analysis/Plots/21-04-01/21-04-01.pptx
+++ b/analysis/Plots/21-04-01/21-04-01.pptx
@@ -199,7 +199,7 @@
           <a:p>
             <a:fld id="{7D64828E-D510-D84E-804B-D833E15804B6}" type="datetimeFigureOut">
               <a:rPr lang="en-US" smtClean="0"/>
-              <a:t>3/31/21</a:t>
+              <a:t>4/1/21</a:t>
             </a:fld>
             <a:endParaRPr lang="en-US"/>
           </a:p>
@@ -925,7 +925,7 @@
           <a:p>
             <a:fld id="{FCF944F5-BC6D-2F41-B451-C277D9666CE8}" type="datetimeFigureOut">
               <a:rPr lang="en-US" smtClean="0"/>
-              <a:t>3/31/21</a:t>
+              <a:t>4/1/21</a:t>
             </a:fld>
             <a:endParaRPr lang="en-US"/>
           </a:p>
@@ -1123,7 +1123,7 @@
           <a:p>
             <a:fld id="{FCF944F5-BC6D-2F41-B451-C277D9666CE8}" type="datetimeFigureOut">
               <a:rPr lang="en-US" smtClean="0"/>
-              <a:t>3/31/21</a:t>
+              <a:t>4/1/21</a:t>
             </a:fld>
             <a:endParaRPr lang="en-US"/>
           </a:p>
@@ -1331,7 +1331,7 @@
           <a:p>
             <a:fld id="{FCF944F5-BC6D-2F41-B451-C277D9666CE8}" type="datetimeFigureOut">
               <a:rPr lang="en-US" smtClean="0"/>
-              <a:t>3/31/21</a:t>
+              <a:t>4/1/21</a:t>
             </a:fld>
             <a:endParaRPr lang="en-US"/>
           </a:p>
@@ -1529,7 +1529,7 @@
           <a:p>
             <a:fld id="{FCF944F5-BC6D-2F41-B451-C277D9666CE8}" type="datetimeFigureOut">
               <a:rPr lang="en-US" smtClean="0"/>
-              <a:t>3/31/21</a:t>
+              <a:t>4/1/21</a:t>
             </a:fld>
             <a:endParaRPr lang="en-US"/>
           </a:p>
@@ -1804,7 +1804,7 @@
           <a:p>
             <a:fld id="{FCF944F5-BC6D-2F41-B451-C277D9666CE8}" type="datetimeFigureOut">
               <a:rPr lang="en-US" smtClean="0"/>
-              <a:t>3/31/21</a:t>
+              <a:t>4/1/21</a:t>
             </a:fld>
             <a:endParaRPr lang="en-US"/>
           </a:p>
@@ -2069,7 +2069,7 @@
           <a:p>
             <a:fld id="{FCF944F5-BC6D-2F41-B451-C277D9666CE8}" type="datetimeFigureOut">
               <a:rPr lang="en-US" smtClean="0"/>
-              <a:t>3/31/21</a:t>
+              <a:t>4/1/21</a:t>
             </a:fld>
             <a:endParaRPr lang="en-US"/>
           </a:p>
@@ -2481,7 +2481,7 @@
           <a:p>
             <a:fld id="{FCF944F5-BC6D-2F41-B451-C277D9666CE8}" type="datetimeFigureOut">
               <a:rPr lang="en-US" smtClean="0"/>
-              <a:t>3/31/21</a:t>
+              <a:t>4/1/21</a:t>
             </a:fld>
             <a:endParaRPr lang="en-US"/>
           </a:p>
@@ -2622,7 +2622,7 @@
           <a:p>
             <a:fld id="{FCF944F5-BC6D-2F41-B451-C277D9666CE8}" type="datetimeFigureOut">
               <a:rPr lang="en-US" smtClean="0"/>
-              <a:t>3/31/21</a:t>
+              <a:t>4/1/21</a:t>
             </a:fld>
             <a:endParaRPr lang="en-US"/>
           </a:p>
@@ -2735,7 +2735,7 @@
           <a:p>
             <a:fld id="{FCF944F5-BC6D-2F41-B451-C277D9666CE8}" type="datetimeFigureOut">
               <a:rPr lang="en-US" smtClean="0"/>
-              <a:t>3/31/21</a:t>
+              <a:t>4/1/21</a:t>
             </a:fld>
             <a:endParaRPr lang="en-US"/>
           </a:p>
@@ -3046,7 +3046,7 @@
           <a:p>
             <a:fld id="{FCF944F5-BC6D-2F41-B451-C277D9666CE8}" type="datetimeFigureOut">
               <a:rPr lang="en-US" smtClean="0"/>
-              <a:t>3/31/21</a:t>
+              <a:t>4/1/21</a:t>
             </a:fld>
             <a:endParaRPr lang="en-US"/>
           </a:p>
@@ -3334,7 +3334,7 @@
           <a:p>
             <a:fld id="{FCF944F5-BC6D-2F41-B451-C277D9666CE8}" type="datetimeFigureOut">
               <a:rPr lang="en-US" smtClean="0"/>
-              <a:t>3/31/21</a:t>
+              <a:t>4/1/21</a:t>
             </a:fld>
             <a:endParaRPr lang="en-US"/>
           </a:p>
@@ -3575,7 +3575,7 @@
           <a:p>
             <a:fld id="{FCF944F5-BC6D-2F41-B451-C277D9666CE8}" type="datetimeFigureOut">
               <a:rPr lang="en-US" smtClean="0"/>
-              <a:t>3/31/21</a:t>
+              <a:t>4/1/21</a:t>
             </a:fld>
             <a:endParaRPr lang="en-US"/>
           </a:p>
@@ -4068,10 +4068,10 @@
       </p:grpSpPr>
       <p:pic>
         <p:nvPicPr>
-          <p:cNvPr id="3" name="Picture 2">
-            <a:extLst>
-              <a:ext uri="{FF2B5EF4-FFF2-40B4-BE49-F238E27FC236}">
-                <a16:creationId xmlns:a16="http://schemas.microsoft.com/office/drawing/2014/main" id="{57CF0AF2-1184-8440-9923-0979FE370FFD}"/>
+          <p:cNvPr id="4" name="Picture 3">
+            <a:extLst>
+              <a:ext uri="{FF2B5EF4-FFF2-40B4-BE49-F238E27FC236}">
+                <a16:creationId xmlns:a16="http://schemas.microsoft.com/office/drawing/2014/main" id="{0A2AD897-025F-604A-8BE0-A5A2CFD0E4A0}"/>
               </a:ext>
             </a:extLst>
           </p:cNvPr>
@@ -4080,16 +4080,15 @@
           </p:cNvPicPr>
           <p:nvPr/>
         </p:nvPicPr>
-        <p:blipFill>
+        <p:blipFill rotWithShape="1">
           <a:blip r:embed="rId3"/>
-          <a:stretch>
-            <a:fillRect/>
-          </a:stretch>
+          <a:srcRect l="-1250" t="15927" r="1250" b="14814"/>
+          <a:stretch/>
         </p:blipFill>
         <p:spPr>
           <a:xfrm>
-            <a:off x="1673695" y="226415"/>
-            <a:ext cx="8844610" cy="6631585"/>
+            <a:off x="654517" y="812800"/>
+            <a:ext cx="10882965" cy="5651500"/>
           </a:xfrm>
           <a:prstGeom prst="rect">
             <a:avLst/>
@@ -4128,10 +4127,10 @@
       </p:grpSpPr>
       <p:grpSp>
         <p:nvGrpSpPr>
-          <p:cNvPr id="7" name="Group 6">
-            <a:extLst>
-              <a:ext uri="{FF2B5EF4-FFF2-40B4-BE49-F238E27FC236}">
-                <a16:creationId xmlns:a16="http://schemas.microsoft.com/office/drawing/2014/main" id="{67D9744B-E033-8D43-98C0-802064A3AD93}"/>
+          <p:cNvPr id="9" name="Group 8">
+            <a:extLst>
+              <a:ext uri="{FF2B5EF4-FFF2-40B4-BE49-F238E27FC236}">
+                <a16:creationId xmlns:a16="http://schemas.microsoft.com/office/drawing/2014/main" id="{0CAE1770-749F-D642-A0EA-62990176E893}"/>
               </a:ext>
             </a:extLst>
           </p:cNvPr>
@@ -4140,18 +4139,104 @@
         </p:nvGrpSpPr>
         <p:grpSpPr>
           <a:xfrm>
-            <a:off x="1841157" y="260865"/>
-            <a:ext cx="9069859" cy="6597135"/>
-            <a:chOff x="2310714" y="130432"/>
-            <a:chExt cx="9069859" cy="6597135"/>
+            <a:off x="907451" y="203200"/>
+            <a:ext cx="10039689" cy="6527800"/>
+            <a:chOff x="445102" y="203200"/>
+            <a:chExt cx="10039689" cy="6527800"/>
           </a:xfrm>
         </p:grpSpPr>
+        <p:grpSp>
+          <p:nvGrpSpPr>
+            <p:cNvPr id="7" name="Group 6">
+              <a:extLst>
+                <a:ext uri="{FF2B5EF4-FFF2-40B4-BE49-F238E27FC236}">
+                  <a16:creationId xmlns:a16="http://schemas.microsoft.com/office/drawing/2014/main" id="{67D9744B-E033-8D43-98C0-802064A3AD93}"/>
+                </a:ext>
+              </a:extLst>
+            </p:cNvPr>
+            <p:cNvGrpSpPr/>
+            <p:nvPr/>
+          </p:nvGrpSpPr>
+          <p:grpSpPr>
+            <a:xfrm>
+              <a:off x="445102" y="1771136"/>
+              <a:ext cx="10039689" cy="3148434"/>
+              <a:chOff x="1118805" y="1691503"/>
+              <a:chExt cx="10039689" cy="3148434"/>
+            </a:xfrm>
+          </p:grpSpPr>
+          <p:pic>
+            <p:nvPicPr>
+              <p:cNvPr id="5" name="Picture 4">
+                <a:extLst>
+                  <a:ext uri="{FF2B5EF4-FFF2-40B4-BE49-F238E27FC236}">
+                    <a16:creationId xmlns:a16="http://schemas.microsoft.com/office/drawing/2014/main" id="{956346B5-1168-AD4F-B5B1-528E792230EB}"/>
+                  </a:ext>
+                </a:extLst>
+              </p:cNvPr>
+              <p:cNvPicPr>
+                <a:picLocks noChangeAspect="1"/>
+              </p:cNvPicPr>
+              <p:nvPr/>
+            </p:nvPicPr>
+            <p:blipFill rotWithShape="1">
+              <a:blip r:embed="rId3"/>
+              <a:srcRect l="86577" t="9761" b="58210"/>
+              <a:stretch/>
+            </p:blipFill>
+            <p:spPr>
+              <a:xfrm>
+                <a:off x="1118805" y="1858797"/>
+                <a:ext cx="1499287" cy="2981140"/>
+              </a:xfrm>
+              <a:prstGeom prst="rect">
+                <a:avLst/>
+              </a:prstGeom>
+            </p:spPr>
+          </p:pic>
+          <p:sp>
+            <p:nvSpPr>
+              <p:cNvPr id="6" name="TextBox 5">
+                <a:extLst>
+                  <a:ext uri="{FF2B5EF4-FFF2-40B4-BE49-F238E27FC236}">
+                    <a16:creationId xmlns:a16="http://schemas.microsoft.com/office/drawing/2014/main" id="{DEFA7BB4-983B-E041-B5BE-5884D7BCD32A}"/>
+                  </a:ext>
+                </a:extLst>
+              </p:cNvPr>
+              <p:cNvSpPr txBox="1"/>
+              <p:nvPr/>
+            </p:nvSpPr>
+            <p:spPr>
+              <a:xfrm>
+                <a:off x="10009316" y="1691503"/>
+                <a:ext cx="1149178" cy="369332"/>
+              </a:xfrm>
+              <a:prstGeom prst="rect">
+                <a:avLst/>
+              </a:prstGeom>
+              <a:noFill/>
+            </p:spPr>
+            <p:txBody>
+              <a:bodyPr wrap="square" rtlCol="0">
+                <a:spAutoFit/>
+              </a:bodyPr>
+              <a:lstStyle/>
+              <a:p>
+                <a:pPr algn="ctr"/>
+                <a:r>
+                  <a:rPr lang="en-US" dirty="0"/>
+                  <a:t>Z-score</a:t>
+                </a:r>
+              </a:p>
+            </p:txBody>
+          </p:sp>
+        </p:grpSp>
         <p:pic>
           <p:nvPicPr>
-            <p:cNvPr id="4" name="Picture 3">
+            <p:cNvPr id="8" name="Picture 7">
               <a:extLst>
                 <a:ext uri="{FF2B5EF4-FFF2-40B4-BE49-F238E27FC236}">
-                  <a16:creationId xmlns:a16="http://schemas.microsoft.com/office/drawing/2014/main" id="{DF11D5F0-851C-1C4E-8E2F-17CCA1682829}"/>
+                  <a16:creationId xmlns:a16="http://schemas.microsoft.com/office/drawing/2014/main" id="{D7F0F980-791E-7747-9C64-F8BE2CEF5709}"/>
                 </a:ext>
               </a:extLst>
             </p:cNvPr>
@@ -4161,85 +4246,20 @@
             <p:nvPr/>
           </p:nvPicPr>
           <p:blipFill rotWithShape="1">
-            <a:blip r:embed="rId3"/>
-            <a:srcRect r="13059"/>
+            <a:blip r:embed="rId4"/>
+            <a:srcRect r="12963"/>
             <a:stretch/>
           </p:blipFill>
           <p:spPr>
             <a:xfrm>
-              <a:off x="2310714" y="130432"/>
-              <a:ext cx="6882713" cy="6597135"/>
+              <a:off x="2504989" y="203200"/>
+              <a:ext cx="6817924" cy="6527800"/>
             </a:xfrm>
             <a:prstGeom prst="rect">
               <a:avLst/>
             </a:prstGeom>
           </p:spPr>
         </p:pic>
-        <p:pic>
-          <p:nvPicPr>
-            <p:cNvPr id="5" name="Picture 4">
-              <a:extLst>
-                <a:ext uri="{FF2B5EF4-FFF2-40B4-BE49-F238E27FC236}">
-                  <a16:creationId xmlns:a16="http://schemas.microsoft.com/office/drawing/2014/main" id="{956346B5-1168-AD4F-B5B1-528E792230EB}"/>
-                </a:ext>
-              </a:extLst>
-            </p:cNvPr>
-            <p:cNvPicPr>
-              <a:picLocks noChangeAspect="1"/>
-            </p:cNvPicPr>
-            <p:nvPr/>
-          </p:nvPicPr>
-          <p:blipFill rotWithShape="1">
-            <a:blip r:embed="rId3"/>
-            <a:srcRect l="86577" t="9761" b="58210"/>
-            <a:stretch/>
-          </p:blipFill>
-          <p:spPr>
-            <a:xfrm>
-              <a:off x="9881286" y="3186463"/>
-              <a:ext cx="1499287" cy="2981140"/>
-            </a:xfrm>
-            <a:prstGeom prst="rect">
-              <a:avLst/>
-            </a:prstGeom>
-          </p:spPr>
-        </p:pic>
-        <p:sp>
-          <p:nvSpPr>
-            <p:cNvPr id="6" name="TextBox 5">
-              <a:extLst>
-                <a:ext uri="{FF2B5EF4-FFF2-40B4-BE49-F238E27FC236}">
-                  <a16:creationId xmlns:a16="http://schemas.microsoft.com/office/drawing/2014/main" id="{DEFA7BB4-983B-E041-B5BE-5884D7BCD32A}"/>
-                </a:ext>
-              </a:extLst>
-            </p:cNvPr>
-            <p:cNvSpPr txBox="1"/>
-            <p:nvPr/>
-          </p:nvSpPr>
-          <p:spPr>
-            <a:xfrm>
-              <a:off x="9193427" y="1742303"/>
-              <a:ext cx="1149178" cy="369332"/>
-            </a:xfrm>
-            <a:prstGeom prst="rect">
-              <a:avLst/>
-            </a:prstGeom>
-            <a:noFill/>
-          </p:spPr>
-          <p:txBody>
-            <a:bodyPr wrap="square" rtlCol="0">
-              <a:spAutoFit/>
-            </a:bodyPr>
-            <a:lstStyle/>
-            <a:p>
-              <a:pPr algn="ctr"/>
-              <a:r>
-                <a:rPr lang="en-US" dirty="0"/>
-                <a:t>Z-score</a:t>
-              </a:r>
-            </a:p>
-          </p:txBody>
-        </p:sp>
       </p:grpSp>
     </p:spTree>
     <p:extLst>

</xml_diff>

<commit_message>
Function to generate matrix for heatmap
</commit_message>
<xml_diff>
--- a/analysis/Plots/21-04-01/21-04-01.pptx
+++ b/analysis/Plots/21-04-01/21-04-01.pptx
@@ -5,12 +5,15 @@
     <p:sldMasterId id="2147483648" r:id="rId1"/>
   </p:sldMasterIdLst>
   <p:notesMasterIdLst>
-    <p:notesMasterId r:id="rId5"/>
+    <p:notesMasterId r:id="rId8"/>
   </p:notesMasterIdLst>
   <p:sldIdLst>
-    <p:sldId id="273" r:id="rId2"/>
-    <p:sldId id="276" r:id="rId3"/>
-    <p:sldId id="277" r:id="rId4"/>
+    <p:sldId id="278" r:id="rId2"/>
+    <p:sldId id="279" r:id="rId3"/>
+    <p:sldId id="280" r:id="rId4"/>
+    <p:sldId id="273" r:id="rId5"/>
+    <p:sldId id="276" r:id="rId6"/>
+    <p:sldId id="277" r:id="rId7"/>
   </p:sldIdLst>
   <p:sldSz cx="12192000" cy="6858000"/>
   <p:notesSz cx="6858000" cy="9144000"/>
@@ -560,7 +563,7 @@
     </p:spTree>
     <p:extLst>
       <p:ext uri="{BB962C8B-B14F-4D97-AF65-F5344CB8AC3E}">
-        <p14:creationId xmlns:p14="http://schemas.microsoft.com/office/powerpoint/2010/main" val="2183522057"/>
+        <p14:creationId xmlns:p14="http://schemas.microsoft.com/office/powerpoint/2010/main" val="488255982"/>
       </p:ext>
     </p:extLst>
   </p:cSld>
@@ -664,7 +667,7 @@
     </p:spTree>
     <p:extLst>
       <p:ext uri="{BB962C8B-B14F-4D97-AF65-F5344CB8AC3E}">
-        <p14:creationId xmlns:p14="http://schemas.microsoft.com/office/powerpoint/2010/main" val="862015328"/>
+        <p14:creationId xmlns:p14="http://schemas.microsoft.com/office/powerpoint/2010/main" val="2142772637"/>
       </p:ext>
     </p:extLst>
   </p:cSld>
@@ -760,6 +763,318 @@
             <a:fld id="{252E00F8-13BB-2644-A11D-55D923009FE7}" type="slidenum">
               <a:rPr lang="en-US" smtClean="0"/>
               <a:t>3</a:t>
+            </a:fld>
+            <a:endParaRPr lang="en-US"/>
+          </a:p>
+        </p:txBody>
+      </p:sp>
+    </p:spTree>
+    <p:extLst>
+      <p:ext uri="{BB962C8B-B14F-4D97-AF65-F5344CB8AC3E}">
+        <p14:creationId xmlns:p14="http://schemas.microsoft.com/office/powerpoint/2010/main" val="368959145"/>
+      </p:ext>
+    </p:extLst>
+  </p:cSld>
+  <p:clrMapOvr>
+    <a:masterClrMapping/>
+  </p:clrMapOvr>
+</p:notes>
+</file>
+
+<file path=ppt/notesSlides/notesSlide4.xml><?xml version="1.0" encoding="utf-8"?>
+<p:notes xmlns:a="http://schemas.openxmlformats.org/drawingml/2006/main" xmlns:r="http://schemas.openxmlformats.org/officeDocument/2006/relationships" xmlns:p="http://schemas.openxmlformats.org/presentationml/2006/main">
+  <p:cSld>
+    <p:spTree>
+      <p:nvGrpSpPr>
+        <p:cNvPr id="1" name=""/>
+        <p:cNvGrpSpPr/>
+        <p:nvPr/>
+      </p:nvGrpSpPr>
+      <p:grpSpPr>
+        <a:xfrm>
+          <a:off x="0" y="0"/>
+          <a:ext cx="0" cy="0"/>
+          <a:chOff x="0" y="0"/>
+          <a:chExt cx="0" cy="0"/>
+        </a:xfrm>
+      </p:grpSpPr>
+      <p:sp>
+        <p:nvSpPr>
+          <p:cNvPr id="2" name="Slide Image Placeholder 1"/>
+          <p:cNvSpPr>
+            <a:spLocks noGrp="1" noRot="1" noChangeAspect="1"/>
+          </p:cNvSpPr>
+          <p:nvPr>
+            <p:ph type="sldImg"/>
+          </p:nvPr>
+        </p:nvSpPr>
+        <p:spPr/>
+      </p:sp>
+      <p:sp>
+        <p:nvSpPr>
+          <p:cNvPr id="3" name="Notes Placeholder 2"/>
+          <p:cNvSpPr>
+            <a:spLocks noGrp="1"/>
+          </p:cNvSpPr>
+          <p:nvPr>
+            <p:ph type="body" idx="1"/>
+          </p:nvPr>
+        </p:nvSpPr>
+        <p:spPr/>
+        <p:txBody>
+          <a:bodyPr/>
+          <a:lstStyle/>
+          <a:p>
+            <a:pPr marL="0" marR="0" lvl="0" indent="0" algn="l" defTabSz="914400" rtl="0" eaLnBrk="1" fontAlgn="auto" latinLnBrk="0" hangingPunct="1">
+              <a:lnSpc>
+                <a:spcPct val="100000"/>
+              </a:lnSpc>
+              <a:spcBef>
+                <a:spcPts val="0"/>
+              </a:spcBef>
+              <a:spcAft>
+                <a:spcPts val="0"/>
+              </a:spcAft>
+              <a:buClrTx/>
+              <a:buSzTx/>
+              <a:buFontTx/>
+              <a:buNone/>
+              <a:tabLst/>
+              <a:defRPr/>
+            </a:pPr>
+            <a:endParaRPr lang="en-US" dirty="0"/>
+          </a:p>
+          <a:p>
+            <a:endParaRPr lang="en-US" dirty="0"/>
+          </a:p>
+        </p:txBody>
+      </p:sp>
+      <p:sp>
+        <p:nvSpPr>
+          <p:cNvPr id="4" name="Slide Number Placeholder 3"/>
+          <p:cNvSpPr>
+            <a:spLocks noGrp="1"/>
+          </p:cNvSpPr>
+          <p:nvPr>
+            <p:ph type="sldNum" sz="quarter" idx="5"/>
+          </p:nvPr>
+        </p:nvSpPr>
+        <p:spPr/>
+        <p:txBody>
+          <a:bodyPr/>
+          <a:lstStyle/>
+          <a:p>
+            <a:fld id="{252E00F8-13BB-2644-A11D-55D923009FE7}" type="slidenum">
+              <a:rPr lang="en-US" smtClean="0"/>
+              <a:t>4</a:t>
+            </a:fld>
+            <a:endParaRPr lang="en-US"/>
+          </a:p>
+        </p:txBody>
+      </p:sp>
+    </p:spTree>
+    <p:extLst>
+      <p:ext uri="{BB962C8B-B14F-4D97-AF65-F5344CB8AC3E}">
+        <p14:creationId xmlns:p14="http://schemas.microsoft.com/office/powerpoint/2010/main" val="2183522057"/>
+      </p:ext>
+    </p:extLst>
+  </p:cSld>
+  <p:clrMapOvr>
+    <a:masterClrMapping/>
+  </p:clrMapOvr>
+</p:notes>
+</file>
+
+<file path=ppt/notesSlides/notesSlide5.xml><?xml version="1.0" encoding="utf-8"?>
+<p:notes xmlns:a="http://schemas.openxmlformats.org/drawingml/2006/main" xmlns:r="http://schemas.openxmlformats.org/officeDocument/2006/relationships" xmlns:p="http://schemas.openxmlformats.org/presentationml/2006/main">
+  <p:cSld>
+    <p:spTree>
+      <p:nvGrpSpPr>
+        <p:cNvPr id="1" name=""/>
+        <p:cNvGrpSpPr/>
+        <p:nvPr/>
+      </p:nvGrpSpPr>
+      <p:grpSpPr>
+        <a:xfrm>
+          <a:off x="0" y="0"/>
+          <a:ext cx="0" cy="0"/>
+          <a:chOff x="0" y="0"/>
+          <a:chExt cx="0" cy="0"/>
+        </a:xfrm>
+      </p:grpSpPr>
+      <p:sp>
+        <p:nvSpPr>
+          <p:cNvPr id="2" name="Slide Image Placeholder 1"/>
+          <p:cNvSpPr>
+            <a:spLocks noGrp="1" noRot="1" noChangeAspect="1"/>
+          </p:cNvSpPr>
+          <p:nvPr>
+            <p:ph type="sldImg"/>
+          </p:nvPr>
+        </p:nvSpPr>
+        <p:spPr/>
+      </p:sp>
+      <p:sp>
+        <p:nvSpPr>
+          <p:cNvPr id="3" name="Notes Placeholder 2"/>
+          <p:cNvSpPr>
+            <a:spLocks noGrp="1"/>
+          </p:cNvSpPr>
+          <p:nvPr>
+            <p:ph type="body" idx="1"/>
+          </p:nvPr>
+        </p:nvSpPr>
+        <p:spPr/>
+        <p:txBody>
+          <a:bodyPr/>
+          <a:lstStyle/>
+          <a:p>
+            <a:pPr marL="0" marR="0" lvl="0" indent="0" algn="l" defTabSz="914400" rtl="0" eaLnBrk="1" fontAlgn="auto" latinLnBrk="0" hangingPunct="1">
+              <a:lnSpc>
+                <a:spcPct val="100000"/>
+              </a:lnSpc>
+              <a:spcBef>
+                <a:spcPts val="0"/>
+              </a:spcBef>
+              <a:spcAft>
+                <a:spcPts val="0"/>
+              </a:spcAft>
+              <a:buClrTx/>
+              <a:buSzTx/>
+              <a:buFontTx/>
+              <a:buNone/>
+              <a:tabLst/>
+              <a:defRPr/>
+            </a:pPr>
+            <a:endParaRPr lang="en-US" dirty="0"/>
+          </a:p>
+          <a:p>
+            <a:endParaRPr lang="en-US" dirty="0"/>
+          </a:p>
+        </p:txBody>
+      </p:sp>
+      <p:sp>
+        <p:nvSpPr>
+          <p:cNvPr id="4" name="Slide Number Placeholder 3"/>
+          <p:cNvSpPr>
+            <a:spLocks noGrp="1"/>
+          </p:cNvSpPr>
+          <p:nvPr>
+            <p:ph type="sldNum" sz="quarter" idx="5"/>
+          </p:nvPr>
+        </p:nvSpPr>
+        <p:spPr/>
+        <p:txBody>
+          <a:bodyPr/>
+          <a:lstStyle/>
+          <a:p>
+            <a:fld id="{252E00F8-13BB-2644-A11D-55D923009FE7}" type="slidenum">
+              <a:rPr lang="en-US" smtClean="0"/>
+              <a:t>5</a:t>
+            </a:fld>
+            <a:endParaRPr lang="en-US"/>
+          </a:p>
+        </p:txBody>
+      </p:sp>
+    </p:spTree>
+    <p:extLst>
+      <p:ext uri="{BB962C8B-B14F-4D97-AF65-F5344CB8AC3E}">
+        <p14:creationId xmlns:p14="http://schemas.microsoft.com/office/powerpoint/2010/main" val="862015328"/>
+      </p:ext>
+    </p:extLst>
+  </p:cSld>
+  <p:clrMapOvr>
+    <a:masterClrMapping/>
+  </p:clrMapOvr>
+</p:notes>
+</file>
+
+<file path=ppt/notesSlides/notesSlide6.xml><?xml version="1.0" encoding="utf-8"?>
+<p:notes xmlns:a="http://schemas.openxmlformats.org/drawingml/2006/main" xmlns:r="http://schemas.openxmlformats.org/officeDocument/2006/relationships" xmlns:p="http://schemas.openxmlformats.org/presentationml/2006/main">
+  <p:cSld>
+    <p:spTree>
+      <p:nvGrpSpPr>
+        <p:cNvPr id="1" name=""/>
+        <p:cNvGrpSpPr/>
+        <p:nvPr/>
+      </p:nvGrpSpPr>
+      <p:grpSpPr>
+        <a:xfrm>
+          <a:off x="0" y="0"/>
+          <a:ext cx="0" cy="0"/>
+          <a:chOff x="0" y="0"/>
+          <a:chExt cx="0" cy="0"/>
+        </a:xfrm>
+      </p:grpSpPr>
+      <p:sp>
+        <p:nvSpPr>
+          <p:cNvPr id="2" name="Slide Image Placeholder 1"/>
+          <p:cNvSpPr>
+            <a:spLocks noGrp="1" noRot="1" noChangeAspect="1"/>
+          </p:cNvSpPr>
+          <p:nvPr>
+            <p:ph type="sldImg"/>
+          </p:nvPr>
+        </p:nvSpPr>
+        <p:spPr/>
+      </p:sp>
+      <p:sp>
+        <p:nvSpPr>
+          <p:cNvPr id="3" name="Notes Placeholder 2"/>
+          <p:cNvSpPr>
+            <a:spLocks noGrp="1"/>
+          </p:cNvSpPr>
+          <p:nvPr>
+            <p:ph type="body" idx="1"/>
+          </p:nvPr>
+        </p:nvSpPr>
+        <p:spPr/>
+        <p:txBody>
+          <a:bodyPr/>
+          <a:lstStyle/>
+          <a:p>
+            <a:pPr marL="0" marR="0" lvl="0" indent="0" algn="l" defTabSz="914400" rtl="0" eaLnBrk="1" fontAlgn="auto" latinLnBrk="0" hangingPunct="1">
+              <a:lnSpc>
+                <a:spcPct val="100000"/>
+              </a:lnSpc>
+              <a:spcBef>
+                <a:spcPts val="0"/>
+              </a:spcBef>
+              <a:spcAft>
+                <a:spcPts val="0"/>
+              </a:spcAft>
+              <a:buClrTx/>
+              <a:buSzTx/>
+              <a:buFontTx/>
+              <a:buNone/>
+              <a:tabLst/>
+              <a:defRPr/>
+            </a:pPr>
+            <a:endParaRPr lang="en-US" dirty="0"/>
+          </a:p>
+          <a:p>
+            <a:endParaRPr lang="en-US" dirty="0"/>
+          </a:p>
+        </p:txBody>
+      </p:sp>
+      <p:sp>
+        <p:nvSpPr>
+          <p:cNvPr id="4" name="Slide Number Placeholder 3"/>
+          <p:cNvSpPr>
+            <a:spLocks noGrp="1"/>
+          </p:cNvSpPr>
+          <p:nvPr>
+            <p:ph type="sldNum" sz="quarter" idx="5"/>
+          </p:nvPr>
+        </p:nvSpPr>
+        <p:spPr/>
+        <p:txBody>
+          <a:bodyPr/>
+          <a:lstStyle/>
+          <a:p>
+            <a:fld id="{252E00F8-13BB-2644-A11D-55D923009FE7}" type="slidenum">
+              <a:rPr lang="en-US" smtClean="0"/>
+              <a:t>6</a:t>
             </a:fld>
             <a:endParaRPr lang="en-US"/>
           </a:p>
@@ -4007,6 +4322,208 @@
         <p:spPr>
           <a:xfrm>
             <a:off x="1704109" y="2631470"/>
+            <a:ext cx="8783781" cy="584775"/>
+          </a:xfrm>
+          <a:prstGeom prst="rect">
+            <a:avLst/>
+          </a:prstGeom>
+          <a:noFill/>
+        </p:spPr>
+        <p:txBody>
+          <a:bodyPr wrap="square" rtlCol="0">
+            <a:spAutoFit/>
+          </a:bodyPr>
+          <a:lstStyle/>
+          <a:p>
+            <a:pPr algn="ctr"/>
+            <a:r>
+              <a:rPr lang="en-US" sz="3200" dirty="0"/>
+              <a:t>Are </a:t>
+            </a:r>
+            <a:r>
+              <a:rPr lang="en-US" sz="3200" dirty="0" err="1"/>
+              <a:t>mTEC</a:t>
+            </a:r>
+            <a:r>
+              <a:rPr lang="en-US" sz="3200" dirty="0"/>
+              <a:t>-HI and </a:t>
+            </a:r>
+            <a:r>
+              <a:rPr lang="en-US" sz="3200" dirty="0" err="1"/>
+              <a:t>mTEC</a:t>
+            </a:r>
+            <a:r>
+              <a:rPr lang="en-US" sz="3200" dirty="0"/>
+              <a:t>-LO</a:t>
+            </a:r>
+          </a:p>
+        </p:txBody>
+      </p:sp>
+    </p:spTree>
+    <p:extLst>
+      <p:ext uri="{BB962C8B-B14F-4D97-AF65-F5344CB8AC3E}">
+        <p14:creationId xmlns:p14="http://schemas.microsoft.com/office/powerpoint/2010/main" val="3347558803"/>
+      </p:ext>
+    </p:extLst>
+  </p:cSld>
+  <p:clrMapOvr>
+    <a:masterClrMapping/>
+  </p:clrMapOvr>
+</p:sld>
+</file>
+
+<file path=ppt/slides/slide2.xml><?xml version="1.0" encoding="utf-8"?>
+<p:sld xmlns:a="http://schemas.openxmlformats.org/drawingml/2006/main" xmlns:r="http://schemas.openxmlformats.org/officeDocument/2006/relationships" xmlns:p="http://schemas.openxmlformats.org/presentationml/2006/main">
+  <p:cSld>
+    <p:spTree>
+      <p:nvGrpSpPr>
+        <p:cNvPr id="1" name=""/>
+        <p:cNvGrpSpPr/>
+        <p:nvPr/>
+      </p:nvGrpSpPr>
+      <p:grpSpPr>
+        <a:xfrm>
+          <a:off x="0" y="0"/>
+          <a:ext cx="0" cy="0"/>
+          <a:chOff x="0" y="0"/>
+          <a:chExt cx="0" cy="0"/>
+        </a:xfrm>
+      </p:grpSpPr>
+      <p:pic>
+        <p:nvPicPr>
+          <p:cNvPr id="4" name="Picture 3">
+            <a:extLst>
+              <a:ext uri="{FF2B5EF4-FFF2-40B4-BE49-F238E27FC236}">
+                <a16:creationId xmlns:a16="http://schemas.microsoft.com/office/drawing/2014/main" id="{8FD302D2-9C4A-2847-B663-06F1324ED17D}"/>
+              </a:ext>
+            </a:extLst>
+          </p:cNvPr>
+          <p:cNvPicPr>
+            <a:picLocks noChangeAspect="1"/>
+          </p:cNvPicPr>
+          <p:nvPr/>
+        </p:nvPicPr>
+        <p:blipFill>
+          <a:blip r:embed="rId3"/>
+          <a:stretch>
+            <a:fillRect/>
+          </a:stretch>
+        </p:blipFill>
+        <p:spPr>
+          <a:xfrm>
+            <a:off x="2690329" y="259442"/>
+            <a:ext cx="7741298" cy="6451082"/>
+          </a:xfrm>
+          <a:prstGeom prst="rect">
+            <a:avLst/>
+          </a:prstGeom>
+        </p:spPr>
+      </p:pic>
+    </p:spTree>
+    <p:extLst>
+      <p:ext uri="{BB962C8B-B14F-4D97-AF65-F5344CB8AC3E}">
+        <p14:creationId xmlns:p14="http://schemas.microsoft.com/office/powerpoint/2010/main" val="4120683186"/>
+      </p:ext>
+    </p:extLst>
+  </p:cSld>
+  <p:clrMapOvr>
+    <a:masterClrMapping/>
+  </p:clrMapOvr>
+</p:sld>
+</file>
+
+<file path=ppt/slides/slide3.xml><?xml version="1.0" encoding="utf-8"?>
+<p:sld xmlns:a="http://schemas.openxmlformats.org/drawingml/2006/main" xmlns:r="http://schemas.openxmlformats.org/officeDocument/2006/relationships" xmlns:p="http://schemas.openxmlformats.org/presentationml/2006/main">
+  <p:cSld>
+    <p:spTree>
+      <p:nvGrpSpPr>
+        <p:cNvPr id="1" name=""/>
+        <p:cNvGrpSpPr/>
+        <p:nvPr/>
+      </p:nvGrpSpPr>
+      <p:grpSpPr>
+        <a:xfrm>
+          <a:off x="0" y="0"/>
+          <a:ext cx="0" cy="0"/>
+          <a:chOff x="0" y="0"/>
+          <a:chExt cx="0" cy="0"/>
+        </a:xfrm>
+      </p:grpSpPr>
+      <p:pic>
+        <p:nvPicPr>
+          <p:cNvPr id="3" name="Picture 2">
+            <a:extLst>
+              <a:ext uri="{FF2B5EF4-FFF2-40B4-BE49-F238E27FC236}">
+                <a16:creationId xmlns:a16="http://schemas.microsoft.com/office/drawing/2014/main" id="{EE544421-B62D-054A-A3AF-7847F785ADBF}"/>
+              </a:ext>
+            </a:extLst>
+          </p:cNvPr>
+          <p:cNvPicPr>
+            <a:picLocks noChangeAspect="1"/>
+          </p:cNvPicPr>
+          <p:nvPr/>
+        </p:nvPicPr>
+        <p:blipFill>
+          <a:blip r:embed="rId3"/>
+          <a:stretch>
+            <a:fillRect/>
+          </a:stretch>
+        </p:blipFill>
+        <p:spPr>
+          <a:xfrm>
+            <a:off x="2146300" y="211667"/>
+            <a:ext cx="7899400" cy="6582833"/>
+          </a:xfrm>
+          <a:prstGeom prst="rect">
+            <a:avLst/>
+          </a:prstGeom>
+        </p:spPr>
+      </p:pic>
+    </p:spTree>
+    <p:extLst>
+      <p:ext uri="{BB962C8B-B14F-4D97-AF65-F5344CB8AC3E}">
+        <p14:creationId xmlns:p14="http://schemas.microsoft.com/office/powerpoint/2010/main" val="4172686350"/>
+      </p:ext>
+    </p:extLst>
+  </p:cSld>
+  <p:clrMapOvr>
+    <a:masterClrMapping/>
+  </p:clrMapOvr>
+</p:sld>
+</file>
+
+<file path=ppt/slides/slide4.xml><?xml version="1.0" encoding="utf-8"?>
+<p:sld xmlns:a="http://schemas.openxmlformats.org/drawingml/2006/main" xmlns:r="http://schemas.openxmlformats.org/officeDocument/2006/relationships" xmlns:p="http://schemas.openxmlformats.org/presentationml/2006/main">
+  <p:cSld>
+    <p:spTree>
+      <p:nvGrpSpPr>
+        <p:cNvPr id="1" name=""/>
+        <p:cNvGrpSpPr/>
+        <p:nvPr/>
+      </p:nvGrpSpPr>
+      <p:grpSpPr>
+        <a:xfrm>
+          <a:off x="0" y="0"/>
+          <a:ext cx="0" cy="0"/>
+          <a:chOff x="0" y="0"/>
+          <a:chExt cx="0" cy="0"/>
+        </a:xfrm>
+      </p:grpSpPr>
+      <p:sp>
+        <p:nvSpPr>
+          <p:cNvPr id="3" name="TextBox 2">
+            <a:extLst>
+              <a:ext uri="{FF2B5EF4-FFF2-40B4-BE49-F238E27FC236}">
+                <a16:creationId xmlns:a16="http://schemas.microsoft.com/office/drawing/2014/main" id="{24943349-A63B-084E-AA48-C69D031C6462}"/>
+              </a:ext>
+            </a:extLst>
+          </p:cNvPr>
+          <p:cNvSpPr txBox="1"/>
+          <p:nvPr/>
+        </p:nvSpPr>
+        <p:spPr>
+          <a:xfrm>
+            <a:off x="1704109" y="2631470"/>
             <a:ext cx="8783781" cy="1077218"/>
           </a:xfrm>
           <a:prstGeom prst="rect">
@@ -4049,7 +4566,7 @@
 </p:sld>
 </file>
 
-<file path=ppt/slides/slide2.xml><?xml version="1.0" encoding="utf-8"?>
+<file path=ppt/slides/slide5.xml><?xml version="1.0" encoding="utf-8"?>
 <p:sld xmlns:a="http://schemas.openxmlformats.org/drawingml/2006/main" xmlns:r="http://schemas.openxmlformats.org/officeDocument/2006/relationships" xmlns:p="http://schemas.openxmlformats.org/presentationml/2006/main">
   <p:cSld>
     <p:spTree>
@@ -4108,7 +4625,7 @@
 </p:sld>
 </file>
 
-<file path=ppt/slides/slide3.xml><?xml version="1.0" encoding="utf-8"?>
+<file path=ppt/slides/slide6.xml><?xml version="1.0" encoding="utf-8"?>
 <p:sld xmlns:a="http://schemas.openxmlformats.org/drawingml/2006/main" xmlns:r="http://schemas.openxmlformats.org/officeDocument/2006/relationships" xmlns:p="http://schemas.openxmlformats.org/presentationml/2006/main">
   <p:cSld>
     <p:spTree>

</xml_diff>